<commit_message>
+) ITSM Change Management
</commit_message>
<xml_diff>
--- a/2nd_sem/itsm/Change Management.pptx
+++ b/2nd_sem/itsm/Change Management.pptx
@@ -9,6 +9,14 @@
     <p:sldId id="257" r:id="rId3"/>
     <p:sldId id="258" r:id="rId4"/>
     <p:sldId id="259" r:id="rId5"/>
+    <p:sldId id="260" r:id="rId6"/>
+    <p:sldId id="261" r:id="rId7"/>
+    <p:sldId id="262" r:id="rId8"/>
+    <p:sldId id="263" r:id="rId9"/>
+    <p:sldId id="264" r:id="rId10"/>
+    <p:sldId id="265" r:id="rId11"/>
+    <p:sldId id="266" r:id="rId12"/>
+    <p:sldId id="267" r:id="rId13"/>
   </p:sldIdLst>
   <p:sldSz cx="9144000" cy="6858000" type="screen4x3"/>
   <p:notesSz cx="6858000" cy="9144000"/>
@@ -2867,7 +2875,7 @@
           <a:p>
             <a:fld id="{1BA50D42-C9CD-4801-B293-61D1F53EC57E}" type="datetimeFigureOut">
               <a:rPr lang="de-DE" smtClean="0"/>
-              <a:t>18.05.2014</a:t>
+              <a:t>20.05.2014</a:t>
             </a:fld>
             <a:endParaRPr lang="de-DE" dirty="0"/>
           </a:p>
@@ -3159,7 +3167,7 @@
           <a:p>
             <a:fld id="{1BA50D42-C9CD-4801-B293-61D1F53EC57E}" type="datetimeFigureOut">
               <a:rPr lang="de-DE" smtClean="0"/>
-              <a:t>18.05.2014</a:t>
+              <a:t>20.05.2014</a:t>
             </a:fld>
             <a:endParaRPr lang="de-DE"/>
           </a:p>
@@ -3334,7 +3342,7 @@
           <a:p>
             <a:fld id="{1BA50D42-C9CD-4801-B293-61D1F53EC57E}" type="datetimeFigureOut">
               <a:rPr lang="de-DE" smtClean="0"/>
-              <a:t>18.05.2014</a:t>
+              <a:t>20.05.2014</a:t>
             </a:fld>
             <a:endParaRPr lang="de-DE"/>
           </a:p>
@@ -3499,7 +3507,7 @@
           <a:p>
             <a:fld id="{1BA50D42-C9CD-4801-B293-61D1F53EC57E}" type="datetimeFigureOut">
               <a:rPr lang="de-DE" smtClean="0"/>
-              <a:t>18.05.2014</a:t>
+              <a:t>20.05.2014</a:t>
             </a:fld>
             <a:endParaRPr lang="de-DE"/>
           </a:p>
@@ -3733,7 +3741,7 @@
           <a:p>
             <a:fld id="{1BA50D42-C9CD-4801-B293-61D1F53EC57E}" type="datetimeFigureOut">
               <a:rPr lang="de-DE" smtClean="0"/>
-              <a:t>18.05.2014</a:t>
+              <a:t>20.05.2014</a:t>
             </a:fld>
             <a:endParaRPr lang="de-DE"/>
           </a:p>
@@ -3846,7 +3854,7 @@
           <a:p>
             <a:fld id="{1BA50D42-C9CD-4801-B293-61D1F53EC57E}" type="datetimeFigureOut">
               <a:rPr lang="de-DE" smtClean="0"/>
-              <a:t>18.05.2014</a:t>
+              <a:t>20.05.2014</a:t>
             </a:fld>
             <a:endParaRPr lang="de-DE"/>
           </a:p>
@@ -4385,7 +4393,7 @@
           <a:p>
             <a:fld id="{1BA50D42-C9CD-4801-B293-61D1F53EC57E}" type="datetimeFigureOut">
               <a:rPr lang="de-DE" smtClean="0"/>
-              <a:t>18.05.2014</a:t>
+              <a:t>20.05.2014</a:t>
             </a:fld>
             <a:endParaRPr lang="de-DE"/>
           </a:p>
@@ -4498,7 +4506,7 @@
           <a:p>
             <a:fld id="{1BA50D42-C9CD-4801-B293-61D1F53EC57E}" type="datetimeFigureOut">
               <a:rPr lang="de-DE" smtClean="0"/>
-              <a:t>18.05.2014</a:t>
+              <a:t>20.05.2014</a:t>
             </a:fld>
             <a:endParaRPr lang="de-DE"/>
           </a:p>
@@ -4588,7 +4596,7 @@
           <a:p>
             <a:fld id="{1BA50D42-C9CD-4801-B293-61D1F53EC57E}" type="datetimeFigureOut">
               <a:rPr lang="de-DE" smtClean="0"/>
-              <a:t>18.05.2014</a:t>
+              <a:t>20.05.2014</a:t>
             </a:fld>
             <a:endParaRPr lang="de-DE"/>
           </a:p>
@@ -7239,7 +7247,7 @@
           <a:p>
             <a:fld id="{1BA50D42-C9CD-4801-B293-61D1F53EC57E}" type="datetimeFigureOut">
               <a:rPr lang="de-DE" smtClean="0"/>
-              <a:t>18.05.2014</a:t>
+              <a:t>20.05.2014</a:t>
             </a:fld>
             <a:endParaRPr lang="de-DE"/>
           </a:p>
@@ -10451,7 +10459,7 @@
           <a:p>
             <a:fld id="{1BA50D42-C9CD-4801-B293-61D1F53EC57E}" type="datetimeFigureOut">
               <a:rPr lang="de-DE" smtClean="0"/>
-              <a:t>18.05.2014</a:t>
+              <a:t>20.05.2014</a:t>
             </a:fld>
             <a:endParaRPr lang="de-DE"/>
           </a:p>
@@ -13273,7 +13281,7 @@
           <a:p>
             <a:fld id="{1BA50D42-C9CD-4801-B293-61D1F53EC57E}" type="datetimeFigureOut">
               <a:rPr lang="de-DE" smtClean="0"/>
-              <a:t>18.05.2014</a:t>
+              <a:t>20.05.2014</a:t>
             </a:fld>
             <a:endParaRPr lang="de-DE"/>
           </a:p>
@@ -13887,6 +13895,449 @@
 </p:sld>
 </file>
 
+<file path=ppt/slides/slide10.xml><?xml version="1.0" encoding="utf-8"?>
+<p:sld xmlns:a="http://schemas.openxmlformats.org/drawingml/2006/main" xmlns:r="http://schemas.openxmlformats.org/officeDocument/2006/relationships" xmlns:p="http://schemas.openxmlformats.org/presentationml/2006/main">
+  <p:cSld>
+    <p:spTree>
+      <p:nvGrpSpPr>
+        <p:cNvPr id="1" name=""/>
+        <p:cNvGrpSpPr/>
+        <p:nvPr/>
+      </p:nvGrpSpPr>
+      <p:grpSpPr>
+        <a:xfrm>
+          <a:off x="0" y="0"/>
+          <a:ext cx="0" cy="0"/>
+          <a:chOff x="0" y="0"/>
+          <a:chExt cx="0" cy="0"/>
+        </a:xfrm>
+      </p:grpSpPr>
+      <p:sp>
+        <p:nvSpPr>
+          <p:cNvPr id="2" name="Titel 1"/>
+          <p:cNvSpPr>
+            <a:spLocks noGrp="1"/>
+          </p:cNvSpPr>
+          <p:nvPr>
+            <p:ph type="title"/>
+          </p:nvPr>
+        </p:nvSpPr>
+        <p:spPr/>
+        <p:txBody>
+          <a:bodyPr/>
+          <a:lstStyle/>
+          <a:p>
+            <a:r>
+              <a:rPr lang="de-AT" dirty="0" smtClean="0"/>
+              <a:t>Fehlerkorrekturplanung</a:t>
+            </a:r>
+            <a:endParaRPr lang="de-AT" dirty="0"/>
+          </a:p>
+        </p:txBody>
+      </p:sp>
+      <p:sp>
+        <p:nvSpPr>
+          <p:cNvPr id="3" name="Inhaltsplatzhalter 2"/>
+          <p:cNvSpPr>
+            <a:spLocks noGrp="1"/>
+          </p:cNvSpPr>
+          <p:nvPr>
+            <p:ph idx="1"/>
+          </p:nvPr>
+        </p:nvSpPr>
+        <p:spPr/>
+        <p:txBody>
+          <a:bodyPr/>
+          <a:lstStyle/>
+          <a:p>
+            <a:endParaRPr lang="de-AT" dirty="0" smtClean="0"/>
+          </a:p>
+          <a:p>
+            <a:endParaRPr lang="de-AT" dirty="0" smtClean="0"/>
+          </a:p>
+          <a:p>
+            <a:r>
+              <a:rPr lang="de-AT" dirty="0" smtClean="0"/>
+              <a:t>Back-out Plan</a:t>
+            </a:r>
+          </a:p>
+          <a:p>
+            <a:endParaRPr lang="de-AT" dirty="0"/>
+          </a:p>
+          <a:p>
+            <a:r>
+              <a:rPr lang="de-AT" dirty="0" smtClean="0"/>
+              <a:t>Business </a:t>
+            </a:r>
+            <a:r>
+              <a:rPr lang="de-AT" dirty="0" err="1" smtClean="0"/>
+              <a:t>Continuity</a:t>
+            </a:r>
+            <a:r>
+              <a:rPr lang="de-AT" dirty="0" smtClean="0"/>
+              <a:t> Plan</a:t>
+            </a:r>
+            <a:endParaRPr lang="de-AT" dirty="0"/>
+          </a:p>
+        </p:txBody>
+      </p:sp>
+      <p:sp>
+        <p:nvSpPr>
+          <p:cNvPr id="4" name="Date Placeholder 3"/>
+          <p:cNvSpPr>
+            <a:spLocks noGrp="1"/>
+          </p:cNvSpPr>
+          <p:nvPr>
+            <p:ph type="dt" sz="half" idx="10"/>
+          </p:nvPr>
+        </p:nvSpPr>
+        <p:spPr>
+          <a:xfrm>
+            <a:off x="4644008" y="224492"/>
+            <a:ext cx="3486980" cy="365125"/>
+          </a:xfrm>
+        </p:spPr>
+        <p:txBody>
+          <a:bodyPr/>
+          <a:lstStyle/>
+          <a:p>
+            <a:pPr algn="ctr"/>
+            <a:r>
+              <a:rPr lang="de-DE" dirty="0" smtClean="0"/>
+              <a:t>Change Management</a:t>
+            </a:r>
+            <a:endParaRPr lang="de-DE" dirty="0"/>
+          </a:p>
+        </p:txBody>
+      </p:sp>
+      <p:sp>
+        <p:nvSpPr>
+          <p:cNvPr id="5" name="Slide Number Placeholder 5"/>
+          <p:cNvSpPr>
+            <a:spLocks noGrp="1"/>
+          </p:cNvSpPr>
+          <p:nvPr>
+            <p:ph type="sldNum" sz="quarter" idx="12"/>
+          </p:nvPr>
+        </p:nvSpPr>
+        <p:spPr>
+          <a:xfrm>
+            <a:off x="6516216" y="5877272"/>
+            <a:ext cx="1332156" cy="365125"/>
+          </a:xfrm>
+        </p:spPr>
+        <p:txBody>
+          <a:bodyPr/>
+          <a:lstStyle/>
+          <a:p>
+            <a:pPr algn="r"/>
+            <a:fld id="{6C6AE60A-B69C-4790-82F7-3882EDF23186}" type="slidenum">
+              <a:rPr lang="de-DE" smtClean="0">
+                <a:solidFill>
+                  <a:schemeClr val="tx1"/>
+                </a:solidFill>
+              </a:rPr>
+              <a:pPr algn="r"/>
+              <a:t>10</a:t>
+            </a:fld>
+            <a:endParaRPr lang="de-DE" dirty="0">
+              <a:solidFill>
+                <a:schemeClr val="tx1"/>
+              </a:solidFill>
+            </a:endParaRPr>
+          </a:p>
+        </p:txBody>
+      </p:sp>
+    </p:spTree>
+    <p:extLst>
+      <p:ext uri="{BB962C8B-B14F-4D97-AF65-F5344CB8AC3E}">
+        <p14:creationId xmlns:p14="http://schemas.microsoft.com/office/powerpoint/2010/main" val="1665472448"/>
+      </p:ext>
+    </p:extLst>
+  </p:cSld>
+  <p:clrMapOvr>
+    <a:masterClrMapping/>
+  </p:clrMapOvr>
+  <p:timing>
+    <p:tnLst>
+      <p:par>
+        <p:cTn id="1" dur="indefinite" restart="never" nodeType="tmRoot"/>
+      </p:par>
+    </p:tnLst>
+  </p:timing>
+</p:sld>
+</file>
+
+<file path=ppt/slides/slide11.xml><?xml version="1.0" encoding="utf-8"?>
+<p:sld xmlns:a="http://schemas.openxmlformats.org/drawingml/2006/main" xmlns:r="http://schemas.openxmlformats.org/officeDocument/2006/relationships" xmlns:p="http://schemas.openxmlformats.org/presentationml/2006/main">
+  <p:cSld>
+    <p:spTree>
+      <p:nvGrpSpPr>
+        <p:cNvPr id="1" name=""/>
+        <p:cNvGrpSpPr/>
+        <p:nvPr/>
+      </p:nvGrpSpPr>
+      <p:grpSpPr>
+        <a:xfrm>
+          <a:off x="0" y="0"/>
+          <a:ext cx="0" cy="0"/>
+          <a:chOff x="0" y="0"/>
+          <a:chExt cx="0" cy="0"/>
+        </a:xfrm>
+      </p:grpSpPr>
+      <p:sp>
+        <p:nvSpPr>
+          <p:cNvPr id="2" name="Titel 1"/>
+          <p:cNvSpPr>
+            <a:spLocks noGrp="1"/>
+          </p:cNvSpPr>
+          <p:nvPr>
+            <p:ph type="title"/>
+          </p:nvPr>
+        </p:nvSpPr>
+        <p:spPr/>
+        <p:txBody>
+          <a:bodyPr>
+            <a:normAutofit fontScale="90000"/>
+          </a:bodyPr>
+          <a:lstStyle/>
+          <a:p>
+            <a:r>
+              <a:rPr lang="de-AT" dirty="0" smtClean="0"/>
+              <a:t>Mögliche Outputs des Change Management</a:t>
+            </a:r>
+            <a:endParaRPr lang="de-AT" dirty="0"/>
+          </a:p>
+        </p:txBody>
+      </p:sp>
+      <p:sp>
+        <p:nvSpPr>
+          <p:cNvPr id="3" name="Inhaltsplatzhalter 2"/>
+          <p:cNvSpPr>
+            <a:spLocks noGrp="1"/>
+          </p:cNvSpPr>
+          <p:nvPr>
+            <p:ph idx="1"/>
+          </p:nvPr>
+        </p:nvSpPr>
+        <p:spPr/>
+        <p:txBody>
+          <a:bodyPr/>
+          <a:lstStyle/>
+          <a:p>
+            <a:endParaRPr lang="de-AT" dirty="0" smtClean="0"/>
+          </a:p>
+          <a:p>
+            <a:r>
+              <a:rPr lang="de-AT" dirty="0" smtClean="0"/>
+              <a:t>Abgelehnte oder genehmigte RFCs</a:t>
+            </a:r>
+          </a:p>
+          <a:p>
+            <a:endParaRPr lang="de-AT" dirty="0"/>
+          </a:p>
+          <a:p>
+            <a:r>
+              <a:rPr lang="de-AT" dirty="0" smtClean="0"/>
+              <a:t>Neue oder geänderte Services, Cis</a:t>
+            </a:r>
+          </a:p>
+          <a:p>
+            <a:endParaRPr lang="de-AT" dirty="0"/>
+          </a:p>
+          <a:p>
+            <a:r>
+              <a:rPr lang="de-AT" dirty="0" smtClean="0"/>
+              <a:t>Aktualisierter Schedule of Change</a:t>
+            </a:r>
+            <a:endParaRPr lang="de-AT" dirty="0"/>
+          </a:p>
+        </p:txBody>
+      </p:sp>
+      <p:sp>
+        <p:nvSpPr>
+          <p:cNvPr id="4" name="Date Placeholder 3"/>
+          <p:cNvSpPr>
+            <a:spLocks noGrp="1"/>
+          </p:cNvSpPr>
+          <p:nvPr>
+            <p:ph type="dt" sz="half" idx="10"/>
+          </p:nvPr>
+        </p:nvSpPr>
+        <p:spPr>
+          <a:xfrm>
+            <a:off x="4644008" y="224492"/>
+            <a:ext cx="3486980" cy="365125"/>
+          </a:xfrm>
+        </p:spPr>
+        <p:txBody>
+          <a:bodyPr/>
+          <a:lstStyle/>
+          <a:p>
+            <a:pPr algn="ctr"/>
+            <a:r>
+              <a:rPr lang="de-DE" dirty="0" smtClean="0"/>
+              <a:t>Change Management</a:t>
+            </a:r>
+            <a:endParaRPr lang="de-DE" dirty="0"/>
+          </a:p>
+        </p:txBody>
+      </p:sp>
+      <p:sp>
+        <p:nvSpPr>
+          <p:cNvPr id="5" name="Slide Number Placeholder 5"/>
+          <p:cNvSpPr>
+            <a:spLocks noGrp="1"/>
+          </p:cNvSpPr>
+          <p:nvPr>
+            <p:ph type="sldNum" sz="quarter" idx="12"/>
+          </p:nvPr>
+        </p:nvSpPr>
+        <p:spPr>
+          <a:xfrm>
+            <a:off x="6516216" y="5877272"/>
+            <a:ext cx="1332156" cy="365125"/>
+          </a:xfrm>
+        </p:spPr>
+        <p:txBody>
+          <a:bodyPr/>
+          <a:lstStyle/>
+          <a:p>
+            <a:pPr algn="r"/>
+            <a:fld id="{6C6AE60A-B69C-4790-82F7-3882EDF23186}" type="slidenum">
+              <a:rPr lang="de-DE" smtClean="0">
+                <a:solidFill>
+                  <a:schemeClr val="tx1"/>
+                </a:solidFill>
+              </a:rPr>
+              <a:pPr algn="r"/>
+              <a:t>11</a:t>
+            </a:fld>
+            <a:endParaRPr lang="de-DE" dirty="0">
+              <a:solidFill>
+                <a:schemeClr val="tx1"/>
+              </a:solidFill>
+            </a:endParaRPr>
+          </a:p>
+        </p:txBody>
+      </p:sp>
+    </p:spTree>
+    <p:extLst>
+      <p:ext uri="{BB962C8B-B14F-4D97-AF65-F5344CB8AC3E}">
+        <p14:creationId xmlns:p14="http://schemas.microsoft.com/office/powerpoint/2010/main" val="2163235148"/>
+      </p:ext>
+    </p:extLst>
+  </p:cSld>
+  <p:clrMapOvr>
+    <a:masterClrMapping/>
+  </p:clrMapOvr>
+  <p:timing>
+    <p:tnLst>
+      <p:par>
+        <p:cTn id="1" dur="indefinite" restart="never" nodeType="tmRoot"/>
+      </p:par>
+    </p:tnLst>
+  </p:timing>
+</p:sld>
+</file>
+
+<file path=ppt/slides/slide12.xml><?xml version="1.0" encoding="utf-8"?>
+<p:sld xmlns:a="http://schemas.openxmlformats.org/drawingml/2006/main" xmlns:r="http://schemas.openxmlformats.org/officeDocument/2006/relationships" xmlns:p="http://schemas.openxmlformats.org/presentationml/2006/main">
+  <p:cSld>
+    <p:spTree>
+      <p:nvGrpSpPr>
+        <p:cNvPr id="1" name=""/>
+        <p:cNvGrpSpPr/>
+        <p:nvPr/>
+      </p:nvGrpSpPr>
+      <p:grpSpPr>
+        <a:xfrm>
+          <a:off x="0" y="0"/>
+          <a:ext cx="0" cy="0"/>
+          <a:chOff x="0" y="0"/>
+          <a:chExt cx="0" cy="0"/>
+        </a:xfrm>
+      </p:grpSpPr>
+      <p:sp>
+        <p:nvSpPr>
+          <p:cNvPr id="2" name="Titel 1"/>
+          <p:cNvSpPr>
+            <a:spLocks noGrp="1"/>
+          </p:cNvSpPr>
+          <p:nvPr>
+            <p:ph type="title"/>
+          </p:nvPr>
+        </p:nvSpPr>
+        <p:spPr>
+          <a:xfrm>
+            <a:off x="971600" y="3140968"/>
+            <a:ext cx="7384784" cy="1143000"/>
+          </a:xfrm>
+        </p:spPr>
+        <p:txBody>
+          <a:bodyPr>
+            <a:noAutofit/>
+          </a:bodyPr>
+          <a:lstStyle/>
+          <a:p>
+            <a:pPr algn="ctr"/>
+            <a:r>
+              <a:rPr lang="de-AT" sz="5000" b="1" dirty="0" smtClean="0"/>
+              <a:t>Danke für die Aufmerksamkeit</a:t>
+            </a:r>
+            <a:endParaRPr lang="de-AT" sz="5000" b="1" dirty="0"/>
+          </a:p>
+        </p:txBody>
+      </p:sp>
+      <p:sp>
+        <p:nvSpPr>
+          <p:cNvPr id="4" name="Date Placeholder 3"/>
+          <p:cNvSpPr>
+            <a:spLocks noGrp="1"/>
+          </p:cNvSpPr>
+          <p:nvPr>
+            <p:ph type="dt" sz="half" idx="10"/>
+          </p:nvPr>
+        </p:nvSpPr>
+        <p:spPr>
+          <a:xfrm>
+            <a:off x="4644008" y="224492"/>
+            <a:ext cx="3486980" cy="365125"/>
+          </a:xfrm>
+        </p:spPr>
+        <p:txBody>
+          <a:bodyPr/>
+          <a:lstStyle/>
+          <a:p>
+            <a:pPr algn="ctr"/>
+            <a:r>
+              <a:rPr lang="de-DE" dirty="0" smtClean="0"/>
+              <a:t>Change Management</a:t>
+            </a:r>
+            <a:endParaRPr lang="de-DE" dirty="0"/>
+          </a:p>
+        </p:txBody>
+      </p:sp>
+    </p:spTree>
+    <p:extLst>
+      <p:ext uri="{BB962C8B-B14F-4D97-AF65-F5344CB8AC3E}">
+        <p14:creationId xmlns:p14="http://schemas.microsoft.com/office/powerpoint/2010/main" val="3226034929"/>
+      </p:ext>
+    </p:extLst>
+  </p:cSld>
+  <p:clrMapOvr>
+    <a:masterClrMapping/>
+  </p:clrMapOvr>
+  <p:timing>
+    <p:tnLst>
+      <p:par>
+        <p:cTn id="1" dur="indefinite" restart="never" nodeType="tmRoot"/>
+      </p:par>
+    </p:tnLst>
+  </p:timing>
+</p:sld>
+</file>
+
 <file path=ppt/slides/slide2.xml><?xml version="1.0" encoding="utf-8"?>
 <p:sld xmlns:a="http://schemas.openxmlformats.org/drawingml/2006/main" xmlns:r="http://schemas.openxmlformats.org/officeDocument/2006/relationships" xmlns:p="http://schemas.openxmlformats.org/presentationml/2006/main">
   <p:cSld>
@@ -14619,6 +15070,1471 @@
     <p:extLst>
       <p:ext uri="{BB962C8B-B14F-4D97-AF65-F5344CB8AC3E}">
         <p14:creationId xmlns:p14="http://schemas.microsoft.com/office/powerpoint/2010/main" val="3374827650"/>
+      </p:ext>
+    </p:extLst>
+  </p:cSld>
+  <p:clrMapOvr>
+    <a:masterClrMapping/>
+  </p:clrMapOvr>
+  <p:timing>
+    <p:tnLst>
+      <p:par>
+        <p:cTn id="1" dur="indefinite" restart="never" nodeType="tmRoot"/>
+      </p:par>
+    </p:tnLst>
+  </p:timing>
+</p:sld>
+</file>
+
+<file path=ppt/slides/slide5.xml><?xml version="1.0" encoding="utf-8"?>
+<p:sld xmlns:a="http://schemas.openxmlformats.org/drawingml/2006/main" xmlns:r="http://schemas.openxmlformats.org/officeDocument/2006/relationships" xmlns:p="http://schemas.openxmlformats.org/presentationml/2006/main">
+  <p:cSld>
+    <p:spTree>
+      <p:nvGrpSpPr>
+        <p:cNvPr id="1" name=""/>
+        <p:cNvGrpSpPr/>
+        <p:nvPr/>
+      </p:nvGrpSpPr>
+      <p:grpSpPr>
+        <a:xfrm>
+          <a:off x="0" y="0"/>
+          <a:ext cx="0" cy="0"/>
+          <a:chOff x="0" y="0"/>
+          <a:chExt cx="0" cy="0"/>
+        </a:xfrm>
+      </p:grpSpPr>
+      <p:sp>
+        <p:nvSpPr>
+          <p:cNvPr id="2" name="Titel 1"/>
+          <p:cNvSpPr>
+            <a:spLocks noGrp="1"/>
+          </p:cNvSpPr>
+          <p:nvPr>
+            <p:ph type="title"/>
+          </p:nvPr>
+        </p:nvSpPr>
+        <p:spPr/>
+        <p:txBody>
+          <a:bodyPr>
+            <a:noAutofit/>
+          </a:bodyPr>
+          <a:lstStyle/>
+          <a:p>
+            <a:r>
+              <a:rPr lang="de-AT" sz="3000" dirty="0" smtClean="0"/>
+              <a:t>Change Management</a:t>
+            </a:r>
+            <a:endParaRPr lang="de-AT" sz="3000" dirty="0"/>
+          </a:p>
+        </p:txBody>
+      </p:sp>
+      <p:sp>
+        <p:nvSpPr>
+          <p:cNvPr id="3" name="Inhaltsplatzhalter 2"/>
+          <p:cNvSpPr>
+            <a:spLocks noGrp="1"/>
+          </p:cNvSpPr>
+          <p:nvPr>
+            <p:ph idx="1"/>
+          </p:nvPr>
+        </p:nvSpPr>
+        <p:spPr/>
+        <p:txBody>
+          <a:bodyPr/>
+          <a:lstStyle/>
+          <a:p>
+            <a:r>
+              <a:rPr lang="de-AT" dirty="0" smtClean="0"/>
+              <a:t>Verwaltet und erstellt Change Prozess</a:t>
+            </a:r>
+          </a:p>
+          <a:p>
+            <a:endParaRPr lang="de-AT" dirty="0"/>
+          </a:p>
+          <a:p>
+            <a:r>
+              <a:rPr lang="de-AT" dirty="0" smtClean="0"/>
+              <a:t>Umfasst:</a:t>
+            </a:r>
+          </a:p>
+          <a:p>
+            <a:endParaRPr lang="de-AT" dirty="0" smtClean="0"/>
+          </a:p>
+        </p:txBody>
+      </p:sp>
+      <p:sp>
+        <p:nvSpPr>
+          <p:cNvPr id="4" name="Date Placeholder 3"/>
+          <p:cNvSpPr>
+            <a:spLocks noGrp="1"/>
+          </p:cNvSpPr>
+          <p:nvPr>
+            <p:ph type="dt" sz="half" idx="10"/>
+          </p:nvPr>
+        </p:nvSpPr>
+        <p:spPr>
+          <a:xfrm>
+            <a:off x="4644008" y="224492"/>
+            <a:ext cx="3486980" cy="365125"/>
+          </a:xfrm>
+        </p:spPr>
+        <p:txBody>
+          <a:bodyPr/>
+          <a:lstStyle/>
+          <a:p>
+            <a:pPr algn="ctr"/>
+            <a:r>
+              <a:rPr lang="de-DE" dirty="0" smtClean="0"/>
+              <a:t>Change Management</a:t>
+            </a:r>
+            <a:endParaRPr lang="de-DE" dirty="0"/>
+          </a:p>
+        </p:txBody>
+      </p:sp>
+      <p:sp>
+        <p:nvSpPr>
+          <p:cNvPr id="5" name="Slide Number Placeholder 5"/>
+          <p:cNvSpPr>
+            <a:spLocks noGrp="1"/>
+          </p:cNvSpPr>
+          <p:nvPr>
+            <p:ph type="sldNum" sz="quarter" idx="12"/>
+          </p:nvPr>
+        </p:nvSpPr>
+        <p:spPr>
+          <a:xfrm>
+            <a:off x="6516216" y="5877272"/>
+            <a:ext cx="1332156" cy="365125"/>
+          </a:xfrm>
+        </p:spPr>
+        <p:txBody>
+          <a:bodyPr/>
+          <a:lstStyle/>
+          <a:p>
+            <a:pPr algn="r"/>
+            <a:fld id="{6C6AE60A-B69C-4790-82F7-3882EDF23186}" type="slidenum">
+              <a:rPr lang="de-DE" smtClean="0">
+                <a:solidFill>
+                  <a:schemeClr val="tx1"/>
+                </a:solidFill>
+              </a:rPr>
+              <a:pPr algn="r"/>
+              <a:t>5</a:t>
+            </a:fld>
+            <a:endParaRPr lang="de-DE" dirty="0">
+              <a:solidFill>
+                <a:schemeClr val="tx1"/>
+              </a:solidFill>
+            </a:endParaRPr>
+          </a:p>
+        </p:txBody>
+      </p:sp>
+      <p:graphicFrame>
+        <p:nvGraphicFramePr>
+          <p:cNvPr id="6" name="Tabelle 5"/>
+          <p:cNvGraphicFramePr>
+            <a:graphicFrameLocks noGrp="1"/>
+          </p:cNvGraphicFramePr>
+          <p:nvPr>
+            <p:extLst>
+              <p:ext uri="{D42A27DB-BD31-4B8C-83A1-F6EECF244321}">
+                <p14:modId xmlns:p14="http://schemas.microsoft.com/office/powerpoint/2010/main" val="3976300559"/>
+              </p:ext>
+            </p:extLst>
+          </p:nvPr>
+        </p:nvGraphicFramePr>
+        <p:xfrm>
+          <a:off x="2915816" y="4005064"/>
+          <a:ext cx="3287688" cy="1854200"/>
+        </p:xfrm>
+        <a:graphic>
+          <a:graphicData uri="http://schemas.openxmlformats.org/drawingml/2006/table">
+            <a:tbl>
+              <a:tblPr firstRow="1" bandRow="1">
+                <a:tableStyleId>{69CF1AB2-1976-4502-BF36-3FF5EA218861}</a:tableStyleId>
+              </a:tblPr>
+              <a:tblGrid>
+                <a:gridCol w="3287688"/>
+              </a:tblGrid>
+              <a:tr h="370840">
+                <a:tc>
+                  <a:txBody>
+                    <a:bodyPr/>
+                    <a:lstStyle/>
+                    <a:p>
+                      <a:pPr algn="ctr"/>
+                      <a:r>
+                        <a:rPr lang="de-AT" sz="1800" b="0" kern="1200" dirty="0" smtClean="0">
+                          <a:solidFill>
+                            <a:schemeClr val="dk1"/>
+                          </a:solidFill>
+                          <a:latin typeface="+mn-lt"/>
+                          <a:ea typeface="+mn-ea"/>
+                          <a:cs typeface="+mn-cs"/>
+                        </a:rPr>
+                        <a:t>Registrieren</a:t>
+                      </a:r>
+                      <a:endParaRPr lang="de-AT" sz="1800" b="0" kern="1200" dirty="0">
+                        <a:solidFill>
+                          <a:schemeClr val="dk1"/>
+                        </a:solidFill>
+                        <a:latin typeface="+mn-lt"/>
+                        <a:ea typeface="+mn-ea"/>
+                        <a:cs typeface="+mn-cs"/>
+                      </a:endParaRPr>
+                    </a:p>
+                  </a:txBody>
+                  <a:tcPr/>
+                </a:tc>
+              </a:tr>
+              <a:tr h="370840">
+                <a:tc>
+                  <a:txBody>
+                    <a:bodyPr/>
+                    <a:lstStyle/>
+                    <a:p>
+                      <a:pPr algn="ctr"/>
+                      <a:r>
+                        <a:rPr lang="de-AT" dirty="0" smtClean="0"/>
+                        <a:t>Akzeptieren</a:t>
+                      </a:r>
+                      <a:endParaRPr lang="de-AT" dirty="0"/>
+                    </a:p>
+                  </a:txBody>
+                  <a:tcPr/>
+                </a:tc>
+              </a:tr>
+              <a:tr h="370840">
+                <a:tc>
+                  <a:txBody>
+                    <a:bodyPr/>
+                    <a:lstStyle/>
+                    <a:p>
+                      <a:pPr algn="ctr"/>
+                      <a:r>
+                        <a:rPr lang="de-AT" dirty="0" smtClean="0"/>
+                        <a:t>Klassifizieren</a:t>
+                      </a:r>
+                    </a:p>
+                  </a:txBody>
+                  <a:tcPr/>
+                </a:tc>
+              </a:tr>
+              <a:tr h="370840">
+                <a:tc>
+                  <a:txBody>
+                    <a:bodyPr/>
+                    <a:lstStyle/>
+                    <a:p>
+                      <a:pPr algn="ctr"/>
+                      <a:r>
+                        <a:rPr lang="de-AT" dirty="0" smtClean="0"/>
+                        <a:t>Planen/ Koordinierung</a:t>
+                      </a:r>
+                      <a:endParaRPr lang="de-AT" dirty="0"/>
+                    </a:p>
+                  </a:txBody>
+                  <a:tcPr/>
+                </a:tc>
+              </a:tr>
+              <a:tr h="370840">
+                <a:tc>
+                  <a:txBody>
+                    <a:bodyPr/>
+                    <a:lstStyle/>
+                    <a:p>
+                      <a:pPr algn="ctr"/>
+                      <a:r>
+                        <a:rPr lang="de-AT" dirty="0" smtClean="0"/>
+                        <a:t>Evaluierung</a:t>
+                      </a:r>
+                      <a:endParaRPr lang="de-AT" dirty="0"/>
+                    </a:p>
+                  </a:txBody>
+                  <a:tcPr/>
+                </a:tc>
+              </a:tr>
+            </a:tbl>
+          </a:graphicData>
+        </a:graphic>
+      </p:graphicFrame>
+      <p:sp>
+        <p:nvSpPr>
+          <p:cNvPr id="7" name="Textfeld 6"/>
+          <p:cNvSpPr txBox="1"/>
+          <p:nvPr/>
+        </p:nvSpPr>
+        <p:spPr>
+          <a:xfrm>
+            <a:off x="9396536" y="2492896"/>
+            <a:ext cx="3168352" cy="646331"/>
+          </a:xfrm>
+          <a:prstGeom prst="rect">
+            <a:avLst/>
+          </a:prstGeom>
+          <a:noFill/>
+        </p:spPr>
+        <p:txBody>
+          <a:bodyPr wrap="square" rtlCol="0">
+            <a:spAutoFit/>
+          </a:bodyPr>
+          <a:lstStyle/>
+          <a:p>
+            <a:r>
+              <a:rPr lang="de-AT" dirty="0" smtClean="0"/>
+              <a:t>Siehe Folie Seite 35.</a:t>
+            </a:r>
+          </a:p>
+          <a:p>
+            <a:r>
+              <a:rPr lang="de-AT" dirty="0" smtClean="0"/>
+              <a:t>Erklären bzw. Ausdrucken</a:t>
+            </a:r>
+          </a:p>
+        </p:txBody>
+      </p:sp>
+    </p:spTree>
+    <p:extLst>
+      <p:ext uri="{BB962C8B-B14F-4D97-AF65-F5344CB8AC3E}">
+        <p14:creationId xmlns:p14="http://schemas.microsoft.com/office/powerpoint/2010/main" val="2132194125"/>
+      </p:ext>
+    </p:extLst>
+  </p:cSld>
+  <p:clrMapOvr>
+    <a:masterClrMapping/>
+  </p:clrMapOvr>
+  <p:timing>
+    <p:tnLst>
+      <p:par>
+        <p:cTn id="1" dur="indefinite" restart="never" nodeType="tmRoot"/>
+      </p:par>
+    </p:tnLst>
+  </p:timing>
+</p:sld>
+</file>
+
+<file path=ppt/slides/slide6.xml><?xml version="1.0" encoding="utf-8"?>
+<p:sld xmlns:a="http://schemas.openxmlformats.org/drawingml/2006/main" xmlns:r="http://schemas.openxmlformats.org/officeDocument/2006/relationships" xmlns:p="http://schemas.openxmlformats.org/presentationml/2006/main">
+  <p:cSld>
+    <p:spTree>
+      <p:nvGrpSpPr>
+        <p:cNvPr id="1" name=""/>
+        <p:cNvGrpSpPr/>
+        <p:nvPr/>
+      </p:nvGrpSpPr>
+      <p:grpSpPr>
+        <a:xfrm>
+          <a:off x="0" y="0"/>
+          <a:ext cx="0" cy="0"/>
+          <a:chOff x="0" y="0"/>
+          <a:chExt cx="0" cy="0"/>
+        </a:xfrm>
+      </p:grpSpPr>
+      <p:sp>
+        <p:nvSpPr>
+          <p:cNvPr id="2" name="Titel 1"/>
+          <p:cNvSpPr>
+            <a:spLocks noGrp="1"/>
+          </p:cNvSpPr>
+          <p:nvPr>
+            <p:ph type="title"/>
+          </p:nvPr>
+        </p:nvSpPr>
+        <p:spPr/>
+        <p:txBody>
+          <a:bodyPr>
+            <a:normAutofit fontScale="90000"/>
+          </a:bodyPr>
+          <a:lstStyle/>
+          <a:p>
+            <a:r>
+              <a:rPr lang="de-AT" dirty="0" smtClean="0"/>
+              <a:t>Indikatoren für schlechtes Change Management</a:t>
+            </a:r>
+            <a:endParaRPr lang="de-AT" dirty="0"/>
+          </a:p>
+        </p:txBody>
+      </p:sp>
+      <p:sp>
+        <p:nvSpPr>
+          <p:cNvPr id="3" name="Inhaltsplatzhalter 2"/>
+          <p:cNvSpPr>
+            <a:spLocks noGrp="1"/>
+          </p:cNvSpPr>
+          <p:nvPr>
+            <p:ph idx="1"/>
+          </p:nvPr>
+        </p:nvSpPr>
+        <p:spPr/>
+        <p:txBody>
+          <a:bodyPr/>
+          <a:lstStyle/>
+          <a:p>
+            <a:endParaRPr lang="de-AT" dirty="0" smtClean="0"/>
+          </a:p>
+          <a:p>
+            <a:r>
+              <a:rPr lang="de-AT" dirty="0" smtClean="0"/>
+              <a:t>Unautorisierte </a:t>
+            </a:r>
+            <a:r>
+              <a:rPr lang="de-AT" dirty="0" err="1" smtClean="0"/>
+              <a:t>Changes</a:t>
+            </a:r>
+            <a:endParaRPr lang="de-AT" dirty="0" smtClean="0"/>
+          </a:p>
+          <a:p>
+            <a:r>
+              <a:rPr lang="de-AT" dirty="0" smtClean="0"/>
+              <a:t>Ungeplante Downtime</a:t>
+            </a:r>
+          </a:p>
+          <a:p>
+            <a:r>
+              <a:rPr lang="de-AT" dirty="0" smtClean="0"/>
+              <a:t>Implementierte </a:t>
+            </a:r>
+            <a:r>
+              <a:rPr lang="de-AT" dirty="0" err="1" smtClean="0"/>
+              <a:t>Changes</a:t>
+            </a:r>
+            <a:r>
+              <a:rPr lang="de-AT" dirty="0" smtClean="0"/>
+              <a:t> mit geringem Erfolg</a:t>
+            </a:r>
+          </a:p>
+          <a:p>
+            <a:r>
+              <a:rPr lang="de-AT" dirty="0" smtClean="0"/>
+              <a:t>Hohe Zahl von „Emergency </a:t>
+            </a:r>
+            <a:r>
+              <a:rPr lang="de-AT" dirty="0" err="1" smtClean="0"/>
+              <a:t>Changes</a:t>
+            </a:r>
+            <a:r>
+              <a:rPr lang="de-AT" dirty="0" smtClean="0"/>
+              <a:t>“</a:t>
+            </a:r>
+          </a:p>
+          <a:p>
+            <a:r>
+              <a:rPr lang="de-AT" dirty="0" smtClean="0"/>
+              <a:t>Verzögerte Projektimplementierung</a:t>
+            </a:r>
+            <a:endParaRPr lang="de-AT" dirty="0"/>
+          </a:p>
+        </p:txBody>
+      </p:sp>
+      <p:sp>
+        <p:nvSpPr>
+          <p:cNvPr id="4" name="Date Placeholder 3"/>
+          <p:cNvSpPr>
+            <a:spLocks noGrp="1"/>
+          </p:cNvSpPr>
+          <p:nvPr>
+            <p:ph type="dt" sz="half" idx="10"/>
+          </p:nvPr>
+        </p:nvSpPr>
+        <p:spPr>
+          <a:xfrm>
+            <a:off x="4644008" y="224492"/>
+            <a:ext cx="3486980" cy="365125"/>
+          </a:xfrm>
+        </p:spPr>
+        <p:txBody>
+          <a:bodyPr/>
+          <a:lstStyle/>
+          <a:p>
+            <a:pPr algn="ctr"/>
+            <a:r>
+              <a:rPr lang="de-DE" dirty="0" smtClean="0"/>
+              <a:t>Change Management</a:t>
+            </a:r>
+            <a:endParaRPr lang="de-DE" dirty="0"/>
+          </a:p>
+        </p:txBody>
+      </p:sp>
+      <p:sp>
+        <p:nvSpPr>
+          <p:cNvPr id="5" name="Slide Number Placeholder 5"/>
+          <p:cNvSpPr>
+            <a:spLocks noGrp="1"/>
+          </p:cNvSpPr>
+          <p:nvPr>
+            <p:ph type="sldNum" sz="quarter" idx="12"/>
+          </p:nvPr>
+        </p:nvSpPr>
+        <p:spPr>
+          <a:xfrm>
+            <a:off x="6516216" y="5877272"/>
+            <a:ext cx="1332156" cy="365125"/>
+          </a:xfrm>
+        </p:spPr>
+        <p:txBody>
+          <a:bodyPr/>
+          <a:lstStyle/>
+          <a:p>
+            <a:pPr algn="r"/>
+            <a:fld id="{6C6AE60A-B69C-4790-82F7-3882EDF23186}" type="slidenum">
+              <a:rPr lang="de-DE" smtClean="0">
+                <a:solidFill>
+                  <a:schemeClr val="tx1"/>
+                </a:solidFill>
+              </a:rPr>
+              <a:pPr algn="r"/>
+              <a:t>6</a:t>
+            </a:fld>
+            <a:endParaRPr lang="de-DE" dirty="0">
+              <a:solidFill>
+                <a:schemeClr val="tx1"/>
+              </a:solidFill>
+            </a:endParaRPr>
+          </a:p>
+        </p:txBody>
+      </p:sp>
+    </p:spTree>
+    <p:extLst>
+      <p:ext uri="{BB962C8B-B14F-4D97-AF65-F5344CB8AC3E}">
+        <p14:creationId xmlns:p14="http://schemas.microsoft.com/office/powerpoint/2010/main" val="1517211856"/>
+      </p:ext>
+    </p:extLst>
+  </p:cSld>
+  <p:clrMapOvr>
+    <a:masterClrMapping/>
+  </p:clrMapOvr>
+  <p:timing>
+    <p:tnLst>
+      <p:par>
+        <p:cTn id="1" dur="indefinite" restart="never" nodeType="tmRoot"/>
+      </p:par>
+    </p:tnLst>
+  </p:timing>
+</p:sld>
+</file>
+
+<file path=ppt/slides/slide7.xml><?xml version="1.0" encoding="utf-8"?>
+<p:sld xmlns:a="http://schemas.openxmlformats.org/drawingml/2006/main" xmlns:r="http://schemas.openxmlformats.org/officeDocument/2006/relationships" xmlns:p="http://schemas.openxmlformats.org/presentationml/2006/main">
+  <p:cSld>
+    <p:spTree>
+      <p:nvGrpSpPr>
+        <p:cNvPr id="1" name=""/>
+        <p:cNvGrpSpPr/>
+        <p:nvPr/>
+      </p:nvGrpSpPr>
+      <p:grpSpPr>
+        <a:xfrm>
+          <a:off x="0" y="0"/>
+          <a:ext cx="0" cy="0"/>
+          <a:chOff x="0" y="0"/>
+          <a:chExt cx="0" cy="0"/>
+        </a:xfrm>
+      </p:grpSpPr>
+      <p:sp>
+        <p:nvSpPr>
+          <p:cNvPr id="2" name="Titel 1"/>
+          <p:cNvSpPr>
+            <a:spLocks noGrp="1"/>
+          </p:cNvSpPr>
+          <p:nvPr>
+            <p:ph type="title"/>
+          </p:nvPr>
+        </p:nvSpPr>
+        <p:spPr/>
+        <p:txBody>
+          <a:bodyPr/>
+          <a:lstStyle/>
+          <a:p>
+            <a:r>
+              <a:rPr lang="de-AT" dirty="0" smtClean="0"/>
+              <a:t>Change Typen</a:t>
+            </a:r>
+            <a:endParaRPr lang="de-AT" dirty="0"/>
+          </a:p>
+        </p:txBody>
+      </p:sp>
+      <p:sp>
+        <p:nvSpPr>
+          <p:cNvPr id="3" name="Inhaltsplatzhalter 2"/>
+          <p:cNvSpPr>
+            <a:spLocks noGrp="1"/>
+          </p:cNvSpPr>
+          <p:nvPr>
+            <p:ph idx="1"/>
+          </p:nvPr>
+        </p:nvSpPr>
+        <p:spPr/>
+        <p:txBody>
+          <a:bodyPr/>
+          <a:lstStyle/>
+          <a:p>
+            <a:endParaRPr lang="de-AT" dirty="0" smtClean="0"/>
+          </a:p>
+          <a:p>
+            <a:r>
+              <a:rPr lang="de-AT" b="1" dirty="0" smtClean="0">
+                <a:solidFill>
+                  <a:srgbClr val="FF0000"/>
+                </a:solidFill>
+              </a:rPr>
+              <a:t>Notfall Change</a:t>
+            </a:r>
+          </a:p>
+          <a:p>
+            <a:endParaRPr lang="de-AT" dirty="0"/>
+          </a:p>
+          <a:p>
+            <a:r>
+              <a:rPr lang="de-AT" b="1" dirty="0" smtClean="0">
+                <a:solidFill>
+                  <a:srgbClr val="FFC000"/>
+                </a:solidFill>
+              </a:rPr>
+              <a:t>Normaler Change</a:t>
+            </a:r>
+          </a:p>
+          <a:p>
+            <a:endParaRPr lang="de-AT" dirty="0"/>
+          </a:p>
+          <a:p>
+            <a:r>
+              <a:rPr lang="de-AT" b="1" dirty="0" smtClean="0">
+                <a:solidFill>
+                  <a:srgbClr val="00B050"/>
+                </a:solidFill>
+              </a:rPr>
+              <a:t>Standard Change</a:t>
+            </a:r>
+            <a:endParaRPr lang="de-AT" b="1" dirty="0">
+              <a:solidFill>
+                <a:srgbClr val="00B050"/>
+              </a:solidFill>
+            </a:endParaRPr>
+          </a:p>
+        </p:txBody>
+      </p:sp>
+      <p:sp>
+        <p:nvSpPr>
+          <p:cNvPr id="4" name="Date Placeholder 3"/>
+          <p:cNvSpPr>
+            <a:spLocks noGrp="1"/>
+          </p:cNvSpPr>
+          <p:nvPr>
+            <p:ph type="dt" sz="half" idx="10"/>
+          </p:nvPr>
+        </p:nvSpPr>
+        <p:spPr>
+          <a:xfrm>
+            <a:off x="4644008" y="224492"/>
+            <a:ext cx="3486980" cy="365125"/>
+          </a:xfrm>
+        </p:spPr>
+        <p:txBody>
+          <a:bodyPr/>
+          <a:lstStyle/>
+          <a:p>
+            <a:pPr algn="ctr"/>
+            <a:r>
+              <a:rPr lang="de-DE" dirty="0" smtClean="0"/>
+              <a:t>Change Management</a:t>
+            </a:r>
+            <a:endParaRPr lang="de-DE" dirty="0"/>
+          </a:p>
+        </p:txBody>
+      </p:sp>
+      <p:sp>
+        <p:nvSpPr>
+          <p:cNvPr id="5" name="Slide Number Placeholder 5"/>
+          <p:cNvSpPr>
+            <a:spLocks noGrp="1"/>
+          </p:cNvSpPr>
+          <p:nvPr>
+            <p:ph type="sldNum" sz="quarter" idx="12"/>
+          </p:nvPr>
+        </p:nvSpPr>
+        <p:spPr>
+          <a:xfrm>
+            <a:off x="6516216" y="5877272"/>
+            <a:ext cx="1332156" cy="365125"/>
+          </a:xfrm>
+        </p:spPr>
+        <p:txBody>
+          <a:bodyPr/>
+          <a:lstStyle/>
+          <a:p>
+            <a:pPr algn="r"/>
+            <a:fld id="{6C6AE60A-B69C-4790-82F7-3882EDF23186}" type="slidenum">
+              <a:rPr lang="de-DE" smtClean="0">
+                <a:solidFill>
+                  <a:schemeClr val="tx1"/>
+                </a:solidFill>
+              </a:rPr>
+              <a:pPr algn="r"/>
+              <a:t>7</a:t>
+            </a:fld>
+            <a:endParaRPr lang="de-DE" dirty="0">
+              <a:solidFill>
+                <a:schemeClr val="tx1"/>
+              </a:solidFill>
+            </a:endParaRPr>
+          </a:p>
+        </p:txBody>
+      </p:sp>
+    </p:spTree>
+    <p:extLst>
+      <p:ext uri="{BB962C8B-B14F-4D97-AF65-F5344CB8AC3E}">
+        <p14:creationId xmlns:p14="http://schemas.microsoft.com/office/powerpoint/2010/main" val="1775087803"/>
+      </p:ext>
+    </p:extLst>
+  </p:cSld>
+  <p:clrMapOvr>
+    <a:masterClrMapping/>
+  </p:clrMapOvr>
+  <p:timing>
+    <p:tnLst>
+      <p:par>
+        <p:cTn id="1" dur="indefinite" restart="never" nodeType="tmRoot"/>
+      </p:par>
+    </p:tnLst>
+  </p:timing>
+</p:sld>
+</file>
+
+<file path=ppt/slides/slide8.xml><?xml version="1.0" encoding="utf-8"?>
+<p:sld xmlns:a="http://schemas.openxmlformats.org/drawingml/2006/main" xmlns:r="http://schemas.openxmlformats.org/officeDocument/2006/relationships" xmlns:p="http://schemas.openxmlformats.org/presentationml/2006/main">
+  <p:cSld>
+    <p:spTree>
+      <p:nvGrpSpPr>
+        <p:cNvPr id="1" name=""/>
+        <p:cNvGrpSpPr/>
+        <p:nvPr/>
+      </p:nvGrpSpPr>
+      <p:grpSpPr>
+        <a:xfrm>
+          <a:off x="0" y="0"/>
+          <a:ext cx="0" cy="0"/>
+          <a:chOff x="0" y="0"/>
+          <a:chExt cx="0" cy="0"/>
+        </a:xfrm>
+      </p:grpSpPr>
+      <p:sp>
+        <p:nvSpPr>
+          <p:cNvPr id="2" name="Titel 1"/>
+          <p:cNvSpPr>
+            <a:spLocks noGrp="1"/>
+          </p:cNvSpPr>
+          <p:nvPr>
+            <p:ph type="title"/>
+          </p:nvPr>
+        </p:nvSpPr>
+        <p:spPr/>
+        <p:txBody>
+          <a:bodyPr/>
+          <a:lstStyle/>
+          <a:p>
+            <a:r>
+              <a:rPr lang="de-AT" dirty="0" smtClean="0"/>
+              <a:t>Change Typen</a:t>
+            </a:r>
+            <a:endParaRPr lang="de-AT" dirty="0"/>
+          </a:p>
+        </p:txBody>
+      </p:sp>
+      <p:graphicFrame>
+        <p:nvGraphicFramePr>
+          <p:cNvPr id="4" name="Inhaltsplatzhalter 3"/>
+          <p:cNvGraphicFramePr>
+            <a:graphicFrameLocks noGrp="1"/>
+          </p:cNvGraphicFramePr>
+          <p:nvPr>
+            <p:ph idx="1"/>
+            <p:extLst>
+              <p:ext uri="{D42A27DB-BD31-4B8C-83A1-F6EECF244321}">
+                <p14:modId xmlns:p14="http://schemas.microsoft.com/office/powerpoint/2010/main" val="1531514518"/>
+              </p:ext>
+            </p:extLst>
+          </p:nvPr>
+        </p:nvGraphicFramePr>
+        <p:xfrm>
+          <a:off x="539552" y="2348880"/>
+          <a:ext cx="8136904" cy="3931920"/>
+        </p:xfrm>
+        <a:graphic>
+          <a:graphicData uri="http://schemas.openxmlformats.org/drawingml/2006/table">
+            <a:tbl>
+              <a:tblPr firstRow="1" bandRow="1">
+                <a:tableStyleId>{5C22544A-7EE6-4342-B048-85BDC9FD1C3A}</a:tableStyleId>
+              </a:tblPr>
+              <a:tblGrid>
+                <a:gridCol w="2304256"/>
+                <a:gridCol w="3672408"/>
+                <a:gridCol w="2160240"/>
+              </a:tblGrid>
+              <a:tr h="370840">
+                <a:tc>
+                  <a:txBody>
+                    <a:bodyPr/>
+                    <a:lstStyle/>
+                    <a:p>
+                      <a:r>
+                        <a:rPr lang="de-AT" dirty="0" smtClean="0"/>
+                        <a:t>Change </a:t>
+                      </a:r>
+                      <a:r>
+                        <a:rPr lang="de-AT" dirty="0" err="1" smtClean="0"/>
+                        <a:t>Types</a:t>
+                      </a:r>
+                      <a:endParaRPr lang="de-AT" dirty="0"/>
+                    </a:p>
+                  </a:txBody>
+                  <a:tcPr/>
+                </a:tc>
+                <a:tc>
+                  <a:txBody>
+                    <a:bodyPr/>
+                    <a:lstStyle/>
+                    <a:p>
+                      <a:r>
+                        <a:rPr lang="de-AT" dirty="0" smtClean="0"/>
+                        <a:t>Change Mode</a:t>
+                      </a:r>
+                      <a:endParaRPr lang="de-AT" dirty="0"/>
+                    </a:p>
+                  </a:txBody>
+                  <a:tcPr/>
+                </a:tc>
+                <a:tc>
+                  <a:txBody>
+                    <a:bodyPr/>
+                    <a:lstStyle/>
+                    <a:p>
+                      <a:r>
+                        <a:rPr lang="de-AT" dirty="0" smtClean="0"/>
+                        <a:t>Change Authenticity</a:t>
+                      </a:r>
+                      <a:endParaRPr lang="de-AT" dirty="0"/>
+                    </a:p>
+                  </a:txBody>
+                  <a:tcPr/>
+                </a:tc>
+              </a:tr>
+              <a:tr h="370840">
+                <a:tc>
+                  <a:txBody>
+                    <a:bodyPr/>
+                    <a:lstStyle/>
+                    <a:p>
+                      <a:r>
+                        <a:rPr lang="de-AT" dirty="0" smtClean="0"/>
+                        <a:t>Standard Change</a:t>
+                      </a:r>
+                      <a:endParaRPr lang="de-AT" dirty="0"/>
+                    </a:p>
+                  </a:txBody>
+                  <a:tcPr/>
+                </a:tc>
+                <a:tc>
+                  <a:txBody>
+                    <a:bodyPr/>
+                    <a:lstStyle/>
+                    <a:p>
+                      <a:pPr marL="285750" indent="-285750">
+                        <a:buFont typeface="Arial" pitchFamily="34" charset="0"/>
+                        <a:buChar char="•"/>
+                      </a:pPr>
+                      <a:r>
+                        <a:rPr lang="de-AT" dirty="0" err="1" smtClean="0"/>
+                        <a:t>Preaproved</a:t>
+                      </a:r>
+                      <a:endParaRPr lang="de-AT" dirty="0" smtClean="0"/>
+                    </a:p>
+                    <a:p>
+                      <a:pPr marL="285750" indent="-285750">
+                        <a:buFont typeface="Arial" pitchFamily="34" charset="0"/>
+                        <a:buChar char="•"/>
+                      </a:pPr>
+                      <a:r>
+                        <a:rPr lang="de-AT" dirty="0" err="1" smtClean="0"/>
+                        <a:t>Well</a:t>
+                      </a:r>
+                      <a:r>
+                        <a:rPr lang="de-AT" baseline="0" dirty="0" smtClean="0"/>
+                        <a:t> </a:t>
+                      </a:r>
+                      <a:r>
+                        <a:rPr lang="de-AT" baseline="0" dirty="0" err="1" smtClean="0"/>
+                        <a:t>tested</a:t>
+                      </a:r>
+                      <a:endParaRPr lang="de-AT" baseline="0" dirty="0" smtClean="0"/>
+                    </a:p>
+                    <a:p>
+                      <a:pPr marL="285750" indent="-285750">
+                        <a:buFont typeface="Arial" pitchFamily="34" charset="0"/>
+                        <a:buChar char="•"/>
+                      </a:pPr>
+                      <a:r>
+                        <a:rPr lang="de-AT" baseline="0" dirty="0" err="1" smtClean="0"/>
+                        <a:t>Defined</a:t>
+                      </a:r>
+                      <a:r>
+                        <a:rPr lang="de-AT" baseline="0" dirty="0" smtClean="0"/>
+                        <a:t> </a:t>
+                      </a:r>
+                      <a:r>
+                        <a:rPr lang="de-AT" baseline="0" dirty="0" err="1" smtClean="0"/>
+                        <a:t>outcome</a:t>
+                      </a:r>
+                      <a:endParaRPr lang="de-AT" baseline="0" dirty="0" smtClean="0"/>
+                    </a:p>
+                    <a:p>
+                      <a:pPr marL="285750" indent="-285750">
+                        <a:buFont typeface="Arial" pitchFamily="34" charset="0"/>
+                        <a:buChar char="•"/>
+                      </a:pPr>
+                      <a:endParaRPr lang="de-AT" dirty="0"/>
+                    </a:p>
+                  </a:txBody>
+                  <a:tcPr/>
+                </a:tc>
+                <a:tc>
+                  <a:txBody>
+                    <a:bodyPr/>
+                    <a:lstStyle/>
+                    <a:p>
+                      <a:r>
+                        <a:rPr lang="de-AT" dirty="0" err="1" smtClean="0"/>
+                        <a:t>Preapproved</a:t>
+                      </a:r>
+                      <a:endParaRPr lang="de-AT" dirty="0"/>
+                    </a:p>
+                  </a:txBody>
+                  <a:tcPr/>
+                </a:tc>
+              </a:tr>
+              <a:tr h="370840">
+                <a:tc>
+                  <a:txBody>
+                    <a:bodyPr/>
+                    <a:lstStyle/>
+                    <a:p>
+                      <a:r>
+                        <a:rPr lang="de-AT" dirty="0" smtClean="0"/>
+                        <a:t>Normal Change</a:t>
+                      </a:r>
+                      <a:endParaRPr lang="de-AT" dirty="0"/>
+                    </a:p>
+                  </a:txBody>
+                  <a:tcPr/>
+                </a:tc>
+                <a:tc>
+                  <a:txBody>
+                    <a:bodyPr/>
+                    <a:lstStyle/>
+                    <a:p>
+                      <a:pPr marL="285750" indent="-285750">
+                        <a:buFont typeface="Arial" pitchFamily="34" charset="0"/>
+                        <a:buChar char="•"/>
+                      </a:pPr>
+                      <a:r>
+                        <a:rPr lang="de-AT" dirty="0" smtClean="0"/>
+                        <a:t>Must</a:t>
+                      </a:r>
+                      <a:r>
+                        <a:rPr lang="de-AT" baseline="0" dirty="0" smtClean="0"/>
+                        <a:t> </a:t>
+                      </a:r>
+                      <a:r>
+                        <a:rPr lang="de-AT" baseline="0" dirty="0" err="1" smtClean="0"/>
+                        <a:t>be</a:t>
+                      </a:r>
+                      <a:r>
+                        <a:rPr lang="de-AT" baseline="0" dirty="0" smtClean="0"/>
+                        <a:t> </a:t>
+                      </a:r>
+                      <a:r>
+                        <a:rPr lang="de-AT" baseline="0" dirty="0" err="1" smtClean="0"/>
+                        <a:t>tested</a:t>
+                      </a:r>
+                      <a:endParaRPr lang="de-AT" baseline="0" dirty="0" smtClean="0"/>
+                    </a:p>
+                    <a:p>
+                      <a:pPr marL="285750" indent="-285750">
+                        <a:buFont typeface="Arial" pitchFamily="34" charset="0"/>
+                        <a:buChar char="•"/>
+                      </a:pPr>
+                      <a:r>
+                        <a:rPr lang="de-AT" baseline="0" dirty="0" smtClean="0"/>
+                        <a:t>Must </a:t>
+                      </a:r>
+                      <a:r>
+                        <a:rPr lang="de-AT" baseline="0" dirty="0" err="1" smtClean="0"/>
+                        <a:t>have</a:t>
+                      </a:r>
+                      <a:r>
+                        <a:rPr lang="de-AT" baseline="0" dirty="0" smtClean="0"/>
+                        <a:t> </a:t>
+                      </a:r>
+                      <a:r>
+                        <a:rPr lang="de-AT" baseline="0" dirty="0" err="1" smtClean="0"/>
+                        <a:t>backout</a:t>
+                      </a:r>
+                      <a:r>
+                        <a:rPr lang="de-AT" baseline="0" dirty="0" smtClean="0"/>
+                        <a:t> </a:t>
+                      </a:r>
+                      <a:r>
+                        <a:rPr lang="de-AT" baseline="0" dirty="0" smtClean="0"/>
+                        <a:t>plan</a:t>
+                      </a:r>
+                    </a:p>
+                  </a:txBody>
+                  <a:tcPr/>
+                </a:tc>
+                <a:tc>
+                  <a:txBody>
+                    <a:bodyPr/>
+                    <a:lstStyle/>
+                    <a:p>
+                      <a:r>
+                        <a:rPr lang="de-AT" dirty="0" smtClean="0"/>
+                        <a:t>Change </a:t>
+                      </a:r>
+                      <a:r>
+                        <a:rPr lang="de-AT" dirty="0" err="1" smtClean="0"/>
+                        <a:t>Advisor</a:t>
+                      </a:r>
+                      <a:endParaRPr lang="de-AT" dirty="0" smtClean="0"/>
+                    </a:p>
+                    <a:p>
+                      <a:r>
+                        <a:rPr lang="de-AT" dirty="0" smtClean="0"/>
+                        <a:t>Board</a:t>
+                      </a:r>
+                    </a:p>
+                    <a:p>
+                      <a:endParaRPr lang="de-AT" dirty="0"/>
+                    </a:p>
+                  </a:txBody>
+                  <a:tcPr/>
+                </a:tc>
+              </a:tr>
+              <a:tr h="370840">
+                <a:tc>
+                  <a:txBody>
+                    <a:bodyPr/>
+                    <a:lstStyle/>
+                    <a:p>
+                      <a:r>
+                        <a:rPr lang="de-AT" dirty="0" err="1" smtClean="0"/>
+                        <a:t>Emergeny</a:t>
+                      </a:r>
+                      <a:r>
+                        <a:rPr lang="de-AT" dirty="0" smtClean="0"/>
+                        <a:t> Change</a:t>
+                      </a:r>
+                      <a:endParaRPr lang="de-AT" dirty="0"/>
+                    </a:p>
+                  </a:txBody>
+                  <a:tcPr/>
+                </a:tc>
+                <a:tc>
+                  <a:txBody>
+                    <a:bodyPr/>
+                    <a:lstStyle/>
+                    <a:p>
+                      <a:pPr marL="285750" indent="-285750">
+                        <a:buFont typeface="Arial" pitchFamily="34" charset="0"/>
+                        <a:buChar char="•"/>
+                      </a:pPr>
+                      <a:r>
+                        <a:rPr lang="de-AT" dirty="0" err="1" smtClean="0"/>
+                        <a:t>Should</a:t>
+                      </a:r>
+                      <a:r>
+                        <a:rPr lang="de-AT" dirty="0" smtClean="0"/>
+                        <a:t> </a:t>
+                      </a:r>
+                      <a:r>
+                        <a:rPr lang="de-AT" dirty="0" err="1" smtClean="0"/>
+                        <a:t>be</a:t>
+                      </a:r>
+                      <a:r>
+                        <a:rPr lang="de-AT" dirty="0" smtClean="0"/>
+                        <a:t> </a:t>
+                      </a:r>
+                      <a:r>
+                        <a:rPr lang="de-AT" dirty="0" err="1" smtClean="0"/>
+                        <a:t>tested</a:t>
+                      </a:r>
+                      <a:endParaRPr lang="de-AT" dirty="0" smtClean="0"/>
+                    </a:p>
+                    <a:p>
+                      <a:pPr marL="285750" marR="0" indent="-285750" algn="l" defTabSz="914400" rtl="0" eaLnBrk="1" fontAlgn="auto" latinLnBrk="0" hangingPunct="1">
+                        <a:lnSpc>
+                          <a:spcPct val="100000"/>
+                        </a:lnSpc>
+                        <a:spcBef>
+                          <a:spcPts val="0"/>
+                        </a:spcBef>
+                        <a:spcAft>
+                          <a:spcPts val="0"/>
+                        </a:spcAft>
+                        <a:buClrTx/>
+                        <a:buSzTx/>
+                        <a:buFont typeface="Arial" pitchFamily="34" charset="0"/>
+                        <a:buChar char="•"/>
+                        <a:tabLst/>
+                        <a:defRPr/>
+                      </a:pPr>
+                      <a:r>
+                        <a:rPr lang="de-AT" baseline="0" dirty="0" err="1" smtClean="0"/>
+                        <a:t>Should</a:t>
+                      </a:r>
+                      <a:r>
+                        <a:rPr lang="de-AT" baseline="0" dirty="0" smtClean="0"/>
+                        <a:t> </a:t>
+                      </a:r>
+                      <a:r>
+                        <a:rPr lang="de-AT" baseline="0" dirty="0" err="1" smtClean="0"/>
+                        <a:t>have</a:t>
+                      </a:r>
+                      <a:r>
+                        <a:rPr lang="de-AT" baseline="0" dirty="0" smtClean="0"/>
+                        <a:t> </a:t>
+                      </a:r>
+                      <a:r>
+                        <a:rPr lang="de-AT" baseline="0" dirty="0" err="1" smtClean="0"/>
+                        <a:t>backout</a:t>
+                      </a:r>
+                      <a:r>
+                        <a:rPr lang="de-AT" baseline="0" dirty="0" smtClean="0"/>
+                        <a:t> plan</a:t>
+                      </a:r>
+                      <a:endParaRPr lang="de-AT" baseline="0" dirty="0" smtClean="0"/>
+                    </a:p>
+                    <a:p>
+                      <a:pPr marL="285750" marR="0" indent="-285750" algn="l" defTabSz="914400" rtl="0" eaLnBrk="1" fontAlgn="auto" latinLnBrk="0" hangingPunct="1">
+                        <a:lnSpc>
+                          <a:spcPct val="100000"/>
+                        </a:lnSpc>
+                        <a:spcBef>
+                          <a:spcPts val="0"/>
+                        </a:spcBef>
+                        <a:spcAft>
+                          <a:spcPts val="0"/>
+                        </a:spcAft>
+                        <a:buClrTx/>
+                        <a:buSzTx/>
+                        <a:buFont typeface="Arial" pitchFamily="34" charset="0"/>
+                        <a:buChar char="•"/>
+                        <a:tabLst/>
+                        <a:defRPr/>
+                      </a:pPr>
+                      <a:r>
+                        <a:rPr lang="de-AT" baseline="0" dirty="0" err="1" smtClean="0"/>
+                        <a:t>Once</a:t>
+                      </a:r>
+                      <a:r>
+                        <a:rPr lang="de-AT" baseline="0" dirty="0" smtClean="0"/>
+                        <a:t> </a:t>
+                      </a:r>
+                      <a:r>
+                        <a:rPr lang="de-AT" baseline="0" dirty="0" err="1" smtClean="0"/>
+                        <a:t>approved</a:t>
+                      </a:r>
+                      <a:endParaRPr lang="de-AT" baseline="0" dirty="0" smtClean="0"/>
+                    </a:p>
+                  </a:txBody>
+                  <a:tcPr/>
+                </a:tc>
+                <a:tc>
+                  <a:txBody>
+                    <a:bodyPr/>
+                    <a:lstStyle/>
+                    <a:p>
+                      <a:r>
+                        <a:rPr lang="de-AT" dirty="0" smtClean="0"/>
+                        <a:t>Emergency Change </a:t>
+                      </a:r>
+                      <a:r>
+                        <a:rPr lang="de-AT" dirty="0" err="1" smtClean="0"/>
+                        <a:t>Advisor</a:t>
+                      </a:r>
+                      <a:r>
+                        <a:rPr lang="de-AT" dirty="0" smtClean="0"/>
+                        <a:t> Board</a:t>
+                      </a:r>
+                    </a:p>
+                    <a:p>
+                      <a:endParaRPr lang="de-AT" dirty="0"/>
+                    </a:p>
+                  </a:txBody>
+                  <a:tcPr/>
+                </a:tc>
+              </a:tr>
+            </a:tbl>
+          </a:graphicData>
+        </a:graphic>
+      </p:graphicFrame>
+      <p:sp>
+        <p:nvSpPr>
+          <p:cNvPr id="5" name="Date Placeholder 3"/>
+          <p:cNvSpPr>
+            <a:spLocks noGrp="1"/>
+          </p:cNvSpPr>
+          <p:nvPr>
+            <p:ph type="dt" sz="half" idx="10"/>
+          </p:nvPr>
+        </p:nvSpPr>
+        <p:spPr>
+          <a:xfrm>
+            <a:off x="4644008" y="224492"/>
+            <a:ext cx="3486980" cy="365125"/>
+          </a:xfrm>
+        </p:spPr>
+        <p:txBody>
+          <a:bodyPr/>
+          <a:lstStyle/>
+          <a:p>
+            <a:pPr algn="ctr"/>
+            <a:r>
+              <a:rPr lang="de-DE" dirty="0" smtClean="0"/>
+              <a:t>Change Management</a:t>
+            </a:r>
+            <a:endParaRPr lang="de-DE" dirty="0"/>
+          </a:p>
+        </p:txBody>
+      </p:sp>
+      <p:sp>
+        <p:nvSpPr>
+          <p:cNvPr id="6" name="Slide Number Placeholder 5"/>
+          <p:cNvSpPr>
+            <a:spLocks noGrp="1"/>
+          </p:cNvSpPr>
+          <p:nvPr>
+            <p:ph type="sldNum" sz="quarter" idx="12"/>
+          </p:nvPr>
+        </p:nvSpPr>
+        <p:spPr>
+          <a:xfrm>
+            <a:off x="6516216" y="5877272"/>
+            <a:ext cx="1332156" cy="365125"/>
+          </a:xfrm>
+        </p:spPr>
+        <p:txBody>
+          <a:bodyPr/>
+          <a:lstStyle/>
+          <a:p>
+            <a:pPr algn="r"/>
+            <a:fld id="{6C6AE60A-B69C-4790-82F7-3882EDF23186}" type="slidenum">
+              <a:rPr lang="de-DE" smtClean="0">
+                <a:solidFill>
+                  <a:schemeClr val="tx1"/>
+                </a:solidFill>
+              </a:rPr>
+              <a:pPr algn="r"/>
+              <a:t>8</a:t>
+            </a:fld>
+            <a:endParaRPr lang="de-DE" dirty="0">
+              <a:solidFill>
+                <a:schemeClr val="tx1"/>
+              </a:solidFill>
+            </a:endParaRPr>
+          </a:p>
+        </p:txBody>
+      </p:sp>
+    </p:spTree>
+    <p:extLst>
+      <p:ext uri="{BB962C8B-B14F-4D97-AF65-F5344CB8AC3E}">
+        <p14:creationId xmlns:p14="http://schemas.microsoft.com/office/powerpoint/2010/main" val="3120395820"/>
+      </p:ext>
+    </p:extLst>
+  </p:cSld>
+  <p:clrMapOvr>
+    <a:masterClrMapping/>
+  </p:clrMapOvr>
+  <p:timing>
+    <p:tnLst>
+      <p:par>
+        <p:cTn id="1" dur="indefinite" restart="never" nodeType="tmRoot"/>
+      </p:par>
+    </p:tnLst>
+  </p:timing>
+</p:sld>
+</file>
+
+<file path=ppt/slides/slide9.xml><?xml version="1.0" encoding="utf-8"?>
+<p:sld xmlns:a="http://schemas.openxmlformats.org/drawingml/2006/main" xmlns:r="http://schemas.openxmlformats.org/officeDocument/2006/relationships" xmlns:p="http://schemas.openxmlformats.org/presentationml/2006/main">
+  <p:cSld>
+    <p:spTree>
+      <p:nvGrpSpPr>
+        <p:cNvPr id="1" name=""/>
+        <p:cNvGrpSpPr/>
+        <p:nvPr/>
+      </p:nvGrpSpPr>
+      <p:grpSpPr>
+        <a:xfrm>
+          <a:off x="0" y="0"/>
+          <a:ext cx="0" cy="0"/>
+          <a:chOff x="0" y="0"/>
+          <a:chExt cx="0" cy="0"/>
+        </a:xfrm>
+      </p:grpSpPr>
+      <p:sp>
+        <p:nvSpPr>
+          <p:cNvPr id="2" name="Titel 1"/>
+          <p:cNvSpPr>
+            <a:spLocks noGrp="1"/>
+          </p:cNvSpPr>
+          <p:nvPr>
+            <p:ph type="title"/>
+          </p:nvPr>
+        </p:nvSpPr>
+        <p:spPr>
+          <a:xfrm>
+            <a:off x="1043490" y="1027664"/>
+            <a:ext cx="7344934" cy="1143000"/>
+          </a:xfrm>
+        </p:spPr>
+        <p:txBody>
+          <a:bodyPr>
+            <a:normAutofit fontScale="90000"/>
+          </a:bodyPr>
+          <a:lstStyle/>
+          <a:p>
+            <a:r>
+              <a:rPr lang="de-AT" dirty="0" smtClean="0"/>
+              <a:t>Prozessablauf normaler Change</a:t>
+            </a:r>
+            <a:endParaRPr lang="de-AT" dirty="0"/>
+          </a:p>
+        </p:txBody>
+      </p:sp>
+      <p:sp>
+        <p:nvSpPr>
+          <p:cNvPr id="4" name="Date Placeholder 3"/>
+          <p:cNvSpPr>
+            <a:spLocks noGrp="1"/>
+          </p:cNvSpPr>
+          <p:nvPr>
+            <p:ph type="dt" sz="half" idx="10"/>
+          </p:nvPr>
+        </p:nvSpPr>
+        <p:spPr>
+          <a:xfrm>
+            <a:off x="4644008" y="224492"/>
+            <a:ext cx="3486980" cy="365125"/>
+          </a:xfrm>
+        </p:spPr>
+        <p:txBody>
+          <a:bodyPr/>
+          <a:lstStyle/>
+          <a:p>
+            <a:pPr algn="ctr"/>
+            <a:r>
+              <a:rPr lang="de-DE" dirty="0" smtClean="0"/>
+              <a:t>Change Management</a:t>
+            </a:r>
+            <a:endParaRPr lang="de-DE" dirty="0"/>
+          </a:p>
+        </p:txBody>
+      </p:sp>
+      <p:sp>
+        <p:nvSpPr>
+          <p:cNvPr id="5" name="Slide Number Placeholder 5"/>
+          <p:cNvSpPr>
+            <a:spLocks noGrp="1"/>
+          </p:cNvSpPr>
+          <p:nvPr>
+            <p:ph type="sldNum" sz="quarter" idx="12"/>
+          </p:nvPr>
+        </p:nvSpPr>
+        <p:spPr>
+          <a:xfrm>
+            <a:off x="6516216" y="5877272"/>
+            <a:ext cx="1332156" cy="365125"/>
+          </a:xfrm>
+        </p:spPr>
+        <p:txBody>
+          <a:bodyPr/>
+          <a:lstStyle/>
+          <a:p>
+            <a:pPr algn="r"/>
+            <a:fld id="{6C6AE60A-B69C-4790-82F7-3882EDF23186}" type="slidenum">
+              <a:rPr lang="de-DE" smtClean="0">
+                <a:solidFill>
+                  <a:schemeClr val="tx1"/>
+                </a:solidFill>
+              </a:rPr>
+              <a:pPr algn="r"/>
+              <a:t>9</a:t>
+            </a:fld>
+            <a:endParaRPr lang="de-DE" dirty="0">
+              <a:solidFill>
+                <a:schemeClr val="tx1"/>
+              </a:solidFill>
+            </a:endParaRPr>
+          </a:p>
+        </p:txBody>
+      </p:sp>
+      <p:pic>
+        <p:nvPicPr>
+          <p:cNvPr id="1026" name="Picture 2"/>
+          <p:cNvPicPr>
+            <a:picLocks noChangeAspect="1" noChangeArrowheads="1"/>
+          </p:cNvPicPr>
+          <p:nvPr/>
+        </p:nvPicPr>
+        <p:blipFill>
+          <a:blip r:embed="rId2">
+            <a:extLst>
+              <a:ext uri="{28A0092B-C50C-407E-A947-70E740481C1C}">
+                <a14:useLocalDpi xmlns:a14="http://schemas.microsoft.com/office/drawing/2010/main" val="0"/>
+              </a:ext>
+            </a:extLst>
+          </a:blip>
+          <a:srcRect/>
+          <a:stretch>
+            <a:fillRect/>
+          </a:stretch>
+        </p:blipFill>
+        <p:spPr bwMode="auto">
+          <a:xfrm>
+            <a:off x="1259632" y="2204864"/>
+            <a:ext cx="6236951" cy="4150798"/>
+          </a:xfrm>
+          <a:prstGeom prst="rect">
+            <a:avLst/>
+          </a:prstGeom>
+          <a:noFill/>
+          <a:ln>
+            <a:noFill/>
+          </a:ln>
+          <a:extLst>
+            <a:ext uri="{909E8E84-426E-40DD-AFC4-6F175D3DCCD1}">
+              <a14:hiddenFill xmlns:a14="http://schemas.microsoft.com/office/drawing/2010/main">
+                <a:solidFill>
+                  <a:schemeClr val="accent1"/>
+                </a:solidFill>
+              </a14:hiddenFill>
+            </a:ext>
+            <a:ext uri="{91240B29-F687-4F45-9708-019B960494DF}">
+              <a14:hiddenLine xmlns:a14="http://schemas.microsoft.com/office/drawing/2010/main" w="9525">
+                <a:solidFill>
+                  <a:schemeClr val="tx1"/>
+                </a:solidFill>
+                <a:miter lim="800000"/>
+                <a:headEnd/>
+                <a:tailEnd/>
+              </a14:hiddenLine>
+            </a:ext>
+          </a:extLst>
+        </p:spPr>
+      </p:pic>
+    </p:spTree>
+    <p:extLst>
+      <p:ext uri="{BB962C8B-B14F-4D97-AF65-F5344CB8AC3E}">
+        <p14:creationId xmlns:p14="http://schemas.microsoft.com/office/powerpoint/2010/main" val="765856858"/>
       </p:ext>
     </p:extLst>
   </p:cSld>

</xml_diff>